<commit_message>
Updated includes, conditional content, and images.
</commit_message>
<xml_diff>
--- a/docs/index.pptx
+++ b/docs/index.pptx
@@ -3198,7 +3198,58 @@
             </a:pPr>
             <a:r>
               <a:rPr/>
-              <a:t>Contact Information</a:t>
+              <a:t>Education</a:t>
+            </a:r>
+          </a:p>
+        </p:txBody>
+      </p:sp>
+      <p:sp>
+        <p:nvSpPr>
+          <p:cNvPr id="3" name="Content Placeholder 2"/>
+          <p:cNvSpPr>
+            <a:spLocks noGrp="1"/>
+          </p:cNvSpPr>
+          <p:nvPr>
+            <p:ph idx="1"/>
+          </p:nvPr>
+        </p:nvSpPr>
+        <p:spPr/>
+        <p:txBody>
+          <a:bodyPr/>
+          <a:lstStyle/>
+          <a:p>
+            <a:pPr lvl="0"/>
+            <a:r>
+              <a:rPr/>
+              <a:t>University of Minnesota, Twin Cities (Degree in progress)</a:t>
+            </a:r>
+          </a:p>
+          <a:p>
+            <a:pPr lvl="1"/>
+            <a:r>
+              <a:rPr/>
+              <a:t>MS Science &amp; Technical Communication</a:t>
+            </a:r>
+          </a:p>
+          <a:p>
+            <a:pPr lvl="0"/>
+            <a:r>
+              <a:rPr/>
+              <a:t>North Dakota State University, Graduation Date May 10, 2010</a:t>
+            </a:r>
+          </a:p>
+          <a:p>
+            <a:pPr lvl="1"/>
+            <a:r>
+              <a:rPr/>
+              <a:t>BS Psychology</a:t>
+            </a:r>
+          </a:p>
+          <a:p>
+            <a:pPr lvl="1"/>
+            <a:r>
+              <a:rPr/>
+              <a:t>Minor Neuroscience</a:t>
             </a:r>
           </a:p>
         </p:txBody>
@@ -3245,7 +3296,7 @@
             </a:pPr>
             <a:r>
               <a:rPr/>
-              <a:t>Education</a:t>
+              <a:t>Work Experience</a:t>
             </a:r>
           </a:p>
         </p:txBody>
@@ -3268,35 +3319,70 @@
             <a:pPr lvl="0"/>
             <a:r>
               <a:rPr/>
-              <a:t>University of Minnesota, Twin Cities (Degree in progress)</a:t>
+              <a:t>Clinical Neurophysiology Technologist III</a:t>
             </a:r>
           </a:p>
           <a:p>
             <a:pPr lvl="1"/>
             <a:r>
               <a:rPr/>
-              <a:t>MS Science &amp; Technical Communication</a:t>
+              <a:t>Mayo Clinic, 2019 - Present</a:t>
+            </a:r>
+          </a:p>
+          <a:p>
+            <a:pPr lvl="2"/>
+            <a:r>
+              <a:rPr/>
+              <a:t>Prepare for and record EEGs, NCTs and ARSs</a:t>
+            </a:r>
+          </a:p>
+          <a:p>
+            <a:pPr lvl="2"/>
+            <a:r>
+              <a:rPr/>
+              <a:t>Explain procedures to patients</a:t>
+            </a:r>
+          </a:p>
+          <a:p>
+            <a:pPr lvl="2"/>
+            <a:r>
+              <a:rPr/>
+              <a:t>Monitor equipment and patient during recording</a:t>
             </a:r>
           </a:p>
           <a:p>
             <a:pPr lvl="0"/>
             <a:r>
               <a:rPr/>
-              <a:t>North Dakota State University, Graduation Date May 10, 2010</a:t>
+              <a:t>Electroneurodiagnostic Techncian</a:t>
             </a:r>
           </a:p>
           <a:p>
             <a:pPr lvl="1"/>
             <a:r>
               <a:rPr/>
-              <a:t>BS Psychology</a:t>
-            </a:r>
-          </a:p>
-          <a:p>
-            <a:pPr lvl="1"/>
-            <a:r>
-              <a:rPr/>
-              <a:t>Minor Neuroscience</a:t>
+              <a:t>Sanford Health, 2016 - 2019</a:t>
+            </a:r>
+          </a:p>
+          <a:p>
+            <a:pPr lvl="2"/>
+            <a:r>
+              <a:rPr/>
+              <a:t>Prepare for and record EEGs and NCTs</a:t>
+            </a:r>
+          </a:p>
+          <a:p>
+            <a:pPr lvl="2"/>
+            <a:r>
+              <a:rPr/>
+              <a:t>Explain procedures to patients</a:t>
+            </a:r>
+          </a:p>
+          <a:p>
+            <a:pPr lvl="2"/>
+            <a:r>
+              <a:rPr/>
+              <a:t>Monitor equipment and patient during recording</a:t>
             </a:r>
           </a:p>
         </p:txBody>
@@ -3343,7 +3429,7 @@
             </a:pPr>
             <a:r>
               <a:rPr/>
-              <a:t>Work Experience</a:t>
+              <a:t>Certifications</a:t>
             </a:r>
           </a:p>
         </p:txBody>
@@ -3366,84 +3452,42 @@
             <a:pPr lvl="0"/>
             <a:r>
               <a:rPr/>
-              <a:t>Clinical Neurophysiology Technologist III</a:t>
+              <a:t>Registered Electroencephalographic Technologist (R.EEG.T.)</a:t>
             </a:r>
           </a:p>
           <a:p>
             <a:pPr lvl="1"/>
             <a:r>
               <a:rPr/>
-              <a:t>Mayo Clinic, 2019 - Present</a:t>
-            </a:r>
-          </a:p>
-          <a:p>
-            <a:pPr lvl="2"/>
-            <a:r>
-              <a:rPr/>
-              <a:t>Prepare for and record EEGs, NCTs and ARSs</a:t>
-            </a:r>
-          </a:p>
-          <a:p>
-            <a:pPr lvl="2"/>
-            <a:r>
-              <a:rPr/>
-              <a:t>Explain procedures to patients</a:t>
-            </a:r>
-          </a:p>
-          <a:p>
-            <a:pPr lvl="2"/>
-            <a:r>
-              <a:rPr/>
-              <a:t>Help patients to be comfortable with the procedure</a:t>
-            </a:r>
-          </a:p>
-          <a:p>
-            <a:pPr lvl="2"/>
-            <a:r>
-              <a:rPr/>
-              <a:t>Monitor equipment and patient during recording</a:t>
+              <a:t>American Board of Registration of Electroencephalographic and Evoked Potential Technologists (ABRET)</a:t>
+            </a:r>
+          </a:p>
+          <a:p>
+            <a:pPr lvl="1"/>
+            <a:r>
+              <a:rPr/>
+              <a:t>01/02/2021 - 12/31/2026</a:t>
             </a:r>
           </a:p>
           <a:p>
             <a:pPr lvl="0"/>
             <a:r>
               <a:rPr/>
-              <a:t>Electroneurodiagnostic Techncian</a:t>
+              <a:t>Certified Nerve Conduction Technologist (CNCT)</a:t>
             </a:r>
           </a:p>
           <a:p>
             <a:pPr lvl="1"/>
             <a:r>
               <a:rPr/>
-              <a:t>Sanford Health, 2016 - 2019</a:t>
-            </a:r>
-          </a:p>
-          <a:p>
-            <a:pPr lvl="2"/>
-            <a:r>
-              <a:rPr/>
-              <a:t>Prepare for and record EEGs and NCTs</a:t>
-            </a:r>
-          </a:p>
-          <a:p>
-            <a:pPr lvl="2"/>
-            <a:r>
-              <a:rPr/>
-              <a:t>Explain procedures to patients</a:t>
-            </a:r>
-          </a:p>
-          <a:p>
-            <a:pPr lvl="2"/>
-            <a:r>
-              <a:rPr/>
-              <a:t>Help patients to be comfortable with the procedure</a:t>
-            </a:r>
-          </a:p>
-          <a:p>
-            <a:pPr lvl="2"/>
-            <a:r>
-              <a:rPr/>
-              <a:t>Monitor equipment and patient during recording</a:t>
+              <a:t>American Board of Electrodiagnostic Medicine (ABEM)</a:t>
+            </a:r>
+          </a:p>
+          <a:p>
+            <a:pPr lvl="1"/>
+            <a:r>
+              <a:rPr/>
+              <a:t>06/07/2017 - 12/31/2027</a:t>
             </a:r>
           </a:p>
         </p:txBody>
@@ -3490,7 +3534,7 @@
             </a:pPr>
             <a:r>
               <a:rPr/>
-              <a:t>Certifications</a:t>
+              <a:t>Research Experience</a:t>
             </a:r>
           </a:p>
         </p:txBody>
@@ -3513,28 +3557,63 @@
             <a:pPr lvl="0"/>
             <a:r>
               <a:rPr/>
-              <a:t>Registered Electroencephalographic Technologist (R.EEG.T.), 01/02/2021 - 12/31/2026</a:t>
+              <a:t>Social Psychophysiology &amp; Health Lab, NDSU</a:t>
             </a:r>
           </a:p>
           <a:p>
             <a:pPr lvl="1"/>
             <a:r>
               <a:rPr/>
-              <a:t>American Board of Registration of Electroencephalographic and Evoked Potential Technologists (ABRET)</a:t>
+              <a:t>Research Lab Assistant</a:t>
+            </a:r>
+          </a:p>
+          <a:p>
+            <a:pPr lvl="1"/>
+            <a:r>
+              <a:rPr/>
+              <a:t>September 2007 - May 2010</a:t>
             </a:r>
           </a:p>
           <a:p>
             <a:pPr lvl="0"/>
             <a:r>
               <a:rPr/>
-              <a:t>Certified Nerve Conduction Technologist (CNCT), 06/07/2017 - 12/31/2027</a:t>
+              <a:t>Personality, Perception &amp; Affect Lab, NDSU</a:t>
             </a:r>
           </a:p>
           <a:p>
             <a:pPr lvl="1"/>
             <a:r>
               <a:rPr/>
-              <a:t>American Board of Electrodiagnostic Medicine (ABEM)</a:t>
+              <a:t>Research Lab Assistant</a:t>
+            </a:r>
+          </a:p>
+          <a:p>
+            <a:pPr lvl="1"/>
+            <a:r>
+              <a:rPr/>
+              <a:t>September 2008 - May 2010</a:t>
+            </a:r>
+          </a:p>
+          <a:p>
+            <a:pPr lvl="0"/>
+            <a:r>
+              <a:rPr/>
+              <a:t>Vision, Attention &amp; Multisensory Integration Lab, NDSU</a:t>
+            </a:r>
+          </a:p>
+          <a:p>
+            <a:pPr lvl="1"/>
+            <a:r>
+              <a:rPr/>
+              <a:t>Research Lab Assistant</a:t>
+            </a:r>
+          </a:p>
+          <a:p>
+            <a:pPr lvl="1"/>
+            <a:r>
+              <a:rPr/>
+              <a:t>January 2009 - May 2010</a:t>
             </a:r>
           </a:p>
         </p:txBody>
@@ -3581,7 +3660,7 @@
             </a:pPr>
             <a:r>
               <a:rPr/>
-              <a:t>Research Experience</a:t>
+              <a:t>Research Presentations</a:t>
             </a:r>
           </a:p>
         </p:txBody>
@@ -3604,63 +3683,56 @@
             <a:pPr lvl="0"/>
             <a:r>
               <a:rPr/>
-              <a:t>Social Psychophysiology &amp; Health Lab, NDSU</a:t>
+              <a:t>Red River Psychology Conference 2010</a:t>
             </a:r>
           </a:p>
           <a:p>
             <a:pPr lvl="1"/>
             <a:r>
               <a:rPr/>
-              <a:t>Research Lab Assistant</a:t>
+              <a:t>Paper Presentation, Honors Thesis</a:t>
             </a:r>
           </a:p>
           <a:p>
             <a:pPr lvl="1"/>
             <a:r>
               <a:rPr/>
-              <a:t>September 2007 - May 2010</a:t>
+              <a:t>Personality Traits and Opinion Modeling: The effects of similarity and dissimilarity of novel stimuli on liking another person</a:t>
+            </a:r>
+          </a:p>
+          <a:p>
+            <a:pPr lvl="1"/>
+            <a:r>
+              <a:rPr/>
+              <a:t>Michelle Winings, Amber Koblitz, MS &amp; Clayton J. Hilmert, PhD</a:t>
             </a:r>
           </a:p>
           <a:p>
             <a:pPr lvl="0"/>
             <a:r>
               <a:rPr/>
-              <a:t>Personality, Perception &amp; Affect Lab, NDSU</a:t>
+              <a:t>Red River Psychology Conference 2008</a:t>
             </a:r>
           </a:p>
           <a:p>
             <a:pPr lvl="1"/>
             <a:r>
               <a:rPr/>
-              <a:t>Research Lab Assistant</a:t>
+              <a:t>Poster Presentation</a:t>
             </a:r>
           </a:p>
           <a:p>
             <a:pPr lvl="1"/>
             <a:r>
               <a:rPr/>
-              <a:t>September 2008 - May 2010</a:t>
-            </a:r>
-          </a:p>
-          <a:p>
-            <a:pPr lvl="0"/>
-            <a:r>
-              <a:rPr/>
-              <a:t>Vision, Attention &amp; Multisensory Integration Lab, NDSU</a:t>
+              <a:t>Attraction and Repulsion: The effects of similarity and dissimilarity on liking another person</a:t>
             </a:r>
           </a:p>
           <a:p>
             <a:pPr lvl="1"/>
             <a:r>
               <a:rPr/>
-              <a:t>Research Lab Assistant</a:t>
-            </a:r>
-          </a:p>
-          <a:p>
-            <a:pPr lvl="1"/>
-            <a:r>
-              <a:rPr/>
-              <a:t>January 2009 - May 2010</a:t>
+              <a:t>Michelle Winings, Andrea Rooney, BA &amp; Clayton J. Hilmert, PhD</a:t>
             </a:r>
           </a:p>
         </p:txBody>
@@ -3707,7 +3779,7 @@
             </a:pPr>
             <a:r>
               <a:rPr/>
-              <a:t>Research Presentations</a:t>
+              <a:t>Honors</a:t>
             </a:r>
           </a:p>
         </p:txBody>
@@ -3730,56 +3802,36 @@
             <a:pPr lvl="0"/>
             <a:r>
               <a:rPr/>
-              <a:t>Red River Psychology Conference 2010</a:t>
+              <a:t>Dr. Patricia Beatty Scholarship, NDSU</a:t>
             </a:r>
           </a:p>
           <a:p>
             <a:pPr lvl="1"/>
             <a:r>
               <a:rPr/>
-              <a:t>Paper Presentation, Honors Thesis</a:t>
-            </a:r>
+              <a:t>2008 - 2010</a:t>
+            </a:r>
+            <a:br/>
           </a:p>
           <a:p>
             <a:pPr lvl="1"/>
             <a:r>
               <a:rPr/>
-              <a:t>Personality Traits and Opinion Modeling: The effects of similarity and dissimilarity of novel stimuli on liking another person</a:t>
+              <a:t>Departmental award for sophomore-level research contributions</a:t>
+            </a:r>
+          </a:p>
+          <a:p>
+            <a:pPr lvl="0"/>
+            <a:r>
+              <a:rPr/>
+              <a:t>Marine Corps Scholarship Foundation</a:t>
             </a:r>
           </a:p>
           <a:p>
             <a:pPr lvl="1"/>
             <a:r>
               <a:rPr/>
-              <a:t>Michelle M. Winings, Amber Koblitz, MS &amp; Clayton J. Hilmert, PhD</a:t>
-            </a:r>
-          </a:p>
-          <a:p>
-            <a:pPr lvl="0"/>
-            <a:r>
-              <a:rPr/>
-              <a:t>Red River Psychology Conference 2008</a:t>
-            </a:r>
-          </a:p>
-          <a:p>
-            <a:pPr lvl="1"/>
-            <a:r>
-              <a:rPr/>
-              <a:t>Poster Presentation</a:t>
-            </a:r>
-          </a:p>
-          <a:p>
-            <a:pPr lvl="1"/>
-            <a:r>
-              <a:rPr/>
-              <a:t>Attraction and Repulsion: The effects of similarity and dissimilarity on liking another person</a:t>
-            </a:r>
-          </a:p>
-          <a:p>
-            <a:pPr lvl="1"/>
-            <a:r>
-              <a:rPr/>
-              <a:t>Michelle M. Winings, Andrea N. Rooney, BA &amp; Clayton J. Hilmert, PhD</a:t>
+              <a:t>2006 - 2010</a:t>
             </a:r>
           </a:p>
         </p:txBody>
@@ -3826,7 +3878,7 @@
             </a:pPr>
             <a:r>
               <a:rPr/>
-              <a:t>Honors &amp; Activities</a:t>
+              <a:t>Academic Activities</a:t>
             </a:r>
           </a:p>
         </p:txBody>
@@ -3849,127 +3901,70 @@
             <a:pPr lvl="0"/>
             <a:r>
               <a:rPr/>
-              <a:t>Dr. Patricia Beatty Scholarship, NDSU</a:t>
+              <a:t>NDSU Psi Chi - Honor Society in Psychology</a:t>
             </a:r>
           </a:p>
           <a:p>
             <a:pPr lvl="1"/>
             <a:r>
               <a:rPr/>
-              <a:t>2008 - 2010</a:t>
-            </a:r>
-            <a:br/>
+              <a:t>NDSU President</a:t>
+            </a:r>
+          </a:p>
+          <a:p>
+            <a:pPr lvl="2"/>
+            <a:r>
+              <a:rPr/>
+              <a:t>January 2010 - May 2010</a:t>
+            </a:r>
           </a:p>
           <a:p>
             <a:pPr lvl="1"/>
             <a:r>
               <a:rPr/>
-              <a:t>Departmental award for sophomore-level research contributions</a:t>
+              <a:t>NDSU Psi Chi Vice President</a:t>
+            </a:r>
+          </a:p>
+          <a:p>
+            <a:pPr lvl="2"/>
+            <a:r>
+              <a:rPr/>
+              <a:t>May 2008 - January 2010</a:t>
             </a:r>
           </a:p>
           <a:p>
             <a:pPr lvl="0"/>
             <a:r>
               <a:rPr/>
-              <a:t>Marine Corps Scholarship Foundation</a:t>
+              <a:t>NDSU Psychology Club</a:t>
             </a:r>
           </a:p>
           <a:p>
             <a:pPr lvl="1"/>
             <a:r>
               <a:rPr/>
-              <a:t>2006 - 2010</a:t>
+              <a:t>September 2006 - May 2010</a:t>
             </a:r>
           </a:p>
           <a:p>
             <a:pPr lvl="0"/>
             <a:r>
               <a:rPr/>
-              <a:t>NDSU Psi Chi - Honor Society in Psychology</a:t>
+              <a:t>NDSU Mortar Board Senior Honor Society</a:t>
             </a:r>
           </a:p>
           <a:p>
             <a:pPr lvl="1"/>
             <a:r>
               <a:rPr/>
-              <a:t>NDSU President</a:t>
+              <a:t>Director of Communications</a:t>
             </a:r>
           </a:p>
           <a:p>
             <a:pPr lvl="2"/>
             <a:r>
               <a:rPr/>
-              <a:t>January 2010 - May 2010</a:t>
-            </a:r>
-          </a:p>
-          <a:p>
-            <a:pPr lvl="1"/>
-            <a:r>
-              <a:rPr/>
-              <a:t>NDSU Psi Chi Vice President</a:t>
-            </a:r>
-          </a:p>
-          <a:p>
-            <a:pPr lvl="2"/>
-            <a:r>
-              <a:rPr/>
-              <a:t>May 2008 - January 2010</a:t>
-            </a:r>
-          </a:p>
-          <a:p>
-            <a:pPr lvl="0"/>
-            <a:r>
-              <a:rPr/>
-              <a:t>NDSU Psychology Club</a:t>
-            </a:r>
-          </a:p>
-          <a:p>
-            <a:pPr lvl="1"/>
-            <a:r>
-              <a:rPr/>
-              <a:t>September 2006 - May 2010</a:t>
-            </a:r>
-          </a:p>
-          <a:p>
-            <a:pPr lvl="0"/>
-            <a:r>
-              <a:rPr/>
-              <a:t>NDSU Mortar Board Senior Honor Society</a:t>
-            </a:r>
-          </a:p>
-          <a:p>
-            <a:pPr lvl="1"/>
-            <a:r>
-              <a:rPr/>
-              <a:t>Director of Communications</a:t>
-            </a:r>
-          </a:p>
-          <a:p>
-            <a:pPr lvl="2"/>
-            <a:r>
-              <a:rPr/>
               <a:t>September 2009 - May 2010</a:t>
-            </a:r>
-          </a:p>
-          <a:p>
-            <a:pPr lvl="0"/>
-            <a:r>
-              <a:rPr/>
-              <a:t>NDSU Golden Key Honour Society</a:t>
-            </a:r>
-          </a:p>
-          <a:p>
-            <a:pPr lvl="1"/>
-            <a:r>
-              <a:rPr/>
-              <a:t>Secretary</a:t>
-            </a:r>
-          </a:p>
-          <a:p>
-            <a:pPr lvl="2"/>
-            <a:r>
-              <a:rPr/>
-              <a:t>April 2008 - May 2010</a:t>
             </a:r>
           </a:p>
         </p:txBody>
@@ -4089,27 +4084,6 @@
             <a:r>
               <a:rPr/>
               <a:t>April 2018 - Present</a:t>
-            </a:r>
-          </a:p>
-          <a:p>
-            <a:pPr lvl="0"/>
-            <a:r>
-              <a:rPr/>
-              <a:t>Red River Community Emergency Response Team</a:t>
-            </a:r>
-          </a:p>
-          <a:p>
-            <a:pPr lvl="1"/>
-            <a:r>
-              <a:rPr/>
-              <a:t>General Volunteer</a:t>
-            </a:r>
-          </a:p>
-          <a:p>
-            <a:pPr lvl="2"/>
-            <a:r>
-              <a:rPr/>
-              <a:t>May 2018 - May 2019</a:t>
             </a:r>
           </a:p>
         </p:txBody>

</xml_diff>